<commit_message>
What remains to be done changes and added link
</commit_message>
<xml_diff>
--- a/FinalPresentationTemplate.pptx
+++ b/FinalPresentationTemplate.pptx
@@ -15,9 +15,9 @@
     <p:sldId id="270" r:id="rId6"/>
     <p:sldId id="261" r:id="rId7"/>
     <p:sldId id="263" r:id="rId8"/>
-    <p:sldId id="264" r:id="rId9"/>
-    <p:sldId id="262" r:id="rId10"/>
-    <p:sldId id="268" r:id="rId11"/>
+    <p:sldId id="268" r:id="rId9"/>
+    <p:sldId id="264" r:id="rId10"/>
+    <p:sldId id="262" r:id="rId11"/>
     <p:sldId id="265" r:id="rId12"/>
     <p:sldId id="266" r:id="rId13"/>
     <p:sldId id="267" r:id="rId14"/>
@@ -5598,7 +5598,7 @@
           <a:p>
             <a:r>
               <a:rPr lang="en-US" dirty="0"/>
-              <a:t>Deployment</a:t>
+              <a:t>Implementation</a:t>
             </a:r>
           </a:p>
         </p:txBody>
@@ -5615,126 +5615,55 @@
         </p:nvSpPr>
         <p:spPr/>
         <p:txBody>
-          <a:bodyPr>
-            <a:normAutofit/>
-          </a:bodyPr>
+          <a:bodyPr/>
           <a:lstStyle/>
           <a:p>
-            <a:pPr lvl="0" fontAlgn="base"/>
+            <a:r>
+              <a:rPr lang="en-US" dirty="0"/>
+              <a:t>Show core use cases</a:t>
+            </a:r>
+          </a:p>
+          <a:p>
+            <a:pPr lvl="1"/>
+            <a:r>
+              <a:rPr lang="en-US" dirty="0"/>
+              <a:t>Creating an account</a:t>
+            </a:r>
+          </a:p>
+          <a:p>
+            <a:pPr lvl="1"/>
+            <a:r>
+              <a:rPr lang="en-US" dirty="0"/>
+              <a:t>Updating your information</a:t>
+            </a:r>
+          </a:p>
+          <a:p>
+            <a:pPr lvl="1"/>
+            <a:r>
+              <a:rPr lang="en-US" dirty="0"/>
+              <a:t>Etc. </a:t>
+            </a:r>
+            <a:r>
+              <a:rPr lang="is-IS" dirty="0"/>
+              <a:t>… relevant to your design</a:t>
+            </a:r>
+          </a:p>
+          <a:p>
+            <a:pPr lvl="1"/>
             <a:r>
               <a:rPr lang="en-US" dirty="0">
-                <a:effectLst/>
-              </a:rPr>
-              <a:t>Hosting Platform: </a:t>
-            </a:r>
-            <a:r>
-              <a:rPr lang="en-US" dirty="0">
-                <a:effectLst/>
                 <a:hlinkClick r:id="rId2"/>
               </a:rPr>
-              <a:t>Amazon Web Services</a:t>
-            </a:r>
-            <a:endParaRPr lang="en-US" dirty="0">
-              <a:effectLst/>
-            </a:endParaRPr>
-          </a:p>
-          <a:p>
-            <a:pPr lvl="0" fontAlgn="base"/>
-            <a:r>
-              <a:rPr lang="en-US" dirty="0">
-                <a:effectLst/>
-              </a:rPr>
-              <a:t>Operating System: </a:t>
-            </a:r>
-            <a:r>
-              <a:rPr lang="en-US" dirty="0">
-                <a:effectLst/>
-                <a:hlinkClick r:id="rId3"/>
-              </a:rPr>
-              <a:t>Ubuntu 16.04.1</a:t>
-            </a:r>
-            <a:endParaRPr lang="en-US" dirty="0">
-              <a:effectLst/>
-            </a:endParaRPr>
-          </a:p>
-          <a:p>
-            <a:pPr lvl="0" fontAlgn="base"/>
-            <a:r>
-              <a:rPr lang="en-US" dirty="0">
-                <a:effectLst/>
-              </a:rPr>
-              <a:t>Web Server: </a:t>
-            </a:r>
-            <a:r>
-              <a:rPr lang="en-US" dirty="0">
-                <a:effectLst/>
-                <a:hlinkClick r:id="rId4"/>
-              </a:rPr>
-              <a:t>Apache HTTP Server 2.4</a:t>
-            </a:r>
-            <a:endParaRPr lang="en-US" dirty="0">
-              <a:effectLst/>
-            </a:endParaRPr>
-          </a:p>
-          <a:p>
-            <a:pPr lvl="0" fontAlgn="base"/>
-            <a:r>
-              <a:rPr lang="en-US" dirty="0">
-                <a:effectLst/>
-              </a:rPr>
-              <a:t>Database: </a:t>
-            </a:r>
-            <a:r>
-              <a:rPr lang="en-US" dirty="0">
-                <a:effectLst/>
-                <a:hlinkClick r:id="rId5"/>
-              </a:rPr>
-              <a:t>MongoDB</a:t>
-            </a:r>
-            <a:endParaRPr lang="en-US" dirty="0">
-              <a:effectLst/>
-            </a:endParaRPr>
-          </a:p>
-          <a:p>
-            <a:r>
-              <a:rPr lang="en-US" dirty="0">
-                <a:effectLst/>
-              </a:rPr>
-              <a:t>Automated deployment is enabled by running bash script as root, which will </a:t>
+              <a:t>http://ec2-35-164-234-183.us-west-2.compute.amazonaws.com</a:t>
             </a:r>
             <a:endParaRPr lang="en-US" dirty="0"/>
-          </a:p>
-          <a:p>
-            <a:pPr lvl="1"/>
-            <a:r>
-              <a:rPr lang="en-US" dirty="0">
-                <a:effectLst/>
-              </a:rPr>
-              <a:t>install apache2, python, mongo driver, Flask and </a:t>
-            </a:r>
-            <a:r>
-              <a:rPr lang="en-US" dirty="0" err="1">
-                <a:effectLst/>
-              </a:rPr>
-              <a:t>mongoDB</a:t>
-            </a:r>
-            <a:endParaRPr lang="en-US" dirty="0">
-              <a:effectLst/>
-            </a:endParaRPr>
-          </a:p>
-          <a:p>
-            <a:pPr lvl="1"/>
-            <a:r>
-              <a:rPr lang="en-US" dirty="0"/>
-              <a:t>migrate source code files to localhost</a:t>
-            </a:r>
           </a:p>
         </p:txBody>
       </p:sp>
     </p:spTree>
     <p:extLst>
       <p:ext uri="{BB962C8B-B14F-4D97-AF65-F5344CB8AC3E}">
-        <p14:creationId xmlns:p14="http://schemas.microsoft.com/office/powerpoint/2010/main" val="936177811"/>
+        <p14:creationId xmlns:p14="http://schemas.microsoft.com/office/powerpoint/2010/main" val="2605384893"/>
       </p:ext>
     </p:extLst>
   </p:cSld>
@@ -5943,7 +5872,7 @@
                   <a:srgbClr val="FF0000"/>
                 </a:solidFill>
               </a:rPr>
-              <a:t>Enable search history??</a:t>
+              <a:t>Search Integration</a:t>
             </a:r>
           </a:p>
           <a:p>
@@ -5956,6 +5885,58 @@
               </a:rPr>
               <a:t>Like/dislike button??</a:t>
             </a:r>
+          </a:p>
+          <a:p>
+            <a:pPr lvl="2"/>
+            <a:r>
+              <a:rPr lang="en-US" dirty="0">
+                <a:solidFill>
+                  <a:srgbClr val="FF0000"/>
+                </a:solidFill>
+              </a:rPr>
+              <a:t>FUTURE!!! </a:t>
+            </a:r>
+          </a:p>
+          <a:p>
+            <a:pPr lvl="1"/>
+            <a:r>
+              <a:rPr lang="en-US" dirty="0">
+                <a:solidFill>
+                  <a:srgbClr val="FF0000"/>
+                </a:solidFill>
+              </a:rPr>
+              <a:t>Account Integration</a:t>
+            </a:r>
+          </a:p>
+          <a:p>
+            <a:pPr lvl="1"/>
+            <a:r>
+              <a:rPr lang="en-US" dirty="0">
+                <a:solidFill>
+                  <a:srgbClr val="FF0000"/>
+                </a:solidFill>
+              </a:rPr>
+              <a:t>Front End Validation</a:t>
+            </a:r>
+          </a:p>
+          <a:p>
+            <a:pPr lvl="1"/>
+            <a:r>
+              <a:rPr lang="en-US" dirty="0">
+                <a:solidFill>
+                  <a:srgbClr val="FF0000"/>
+                </a:solidFill>
+              </a:rPr>
+              <a:t>Download Files Integration</a:t>
+            </a:r>
+          </a:p>
+          <a:p>
+            <a:pPr lvl="1"/>
+            <a:endParaRPr lang="en-US" dirty="0">
+              <a:solidFill>
+                <a:srgbClr val="FF0000"/>
+              </a:solidFill>
+            </a:endParaRPr>
           </a:p>
         </p:txBody>
       </p:sp>
@@ -9319,42 +9300,140 @@
         </p:nvSpPr>
         <p:spPr/>
         <p:txBody>
+          <a:bodyPr/>
+          <a:lstStyle/>
+          <a:p>
+            <a:r>
+              <a:rPr lang="en-US" dirty="0"/>
+              <a:t>Deployment</a:t>
+            </a:r>
+          </a:p>
+        </p:txBody>
+      </p:sp>
+      <p:sp>
+        <p:nvSpPr>
+          <p:cNvPr id="3" name="Content Placeholder 2"/>
+          <p:cNvSpPr>
+            <a:spLocks noGrp="1"/>
+          </p:cNvSpPr>
+          <p:nvPr>
+            <p:ph idx="1"/>
+          </p:nvPr>
+        </p:nvSpPr>
+        <p:spPr/>
+        <p:txBody>
           <a:bodyPr>
             <a:normAutofit/>
           </a:bodyPr>
           <a:lstStyle/>
           <a:p>
+            <a:pPr lvl="0" fontAlgn="base"/>
+            <a:r>
+              <a:rPr lang="en-US" dirty="0">
+                <a:effectLst/>
+              </a:rPr>
+              <a:t>Hosting Platform: </a:t>
+            </a:r>
+            <a:r>
+              <a:rPr lang="en-US" dirty="0">
+                <a:effectLst/>
+                <a:hlinkClick r:id="rId2"/>
+              </a:rPr>
+              <a:t>Amazon Web Services</a:t>
+            </a:r>
+            <a:endParaRPr lang="en-US" dirty="0">
+              <a:effectLst/>
+            </a:endParaRPr>
+          </a:p>
+          <a:p>
+            <a:pPr lvl="0" fontAlgn="base"/>
+            <a:r>
+              <a:rPr lang="en-US" dirty="0">
+                <a:effectLst/>
+              </a:rPr>
+              <a:t>Operating System: </a:t>
+            </a:r>
+            <a:r>
+              <a:rPr lang="en-US" dirty="0">
+                <a:effectLst/>
+                <a:hlinkClick r:id="rId3"/>
+              </a:rPr>
+              <a:t>Ubuntu 16.04.1</a:t>
+            </a:r>
+            <a:endParaRPr lang="en-US" dirty="0">
+              <a:effectLst/>
+            </a:endParaRPr>
+          </a:p>
+          <a:p>
+            <a:pPr lvl="0" fontAlgn="base"/>
+            <a:r>
+              <a:rPr lang="en-US" dirty="0">
+                <a:effectLst/>
+              </a:rPr>
+              <a:t>Web Server: </a:t>
+            </a:r>
+            <a:r>
+              <a:rPr lang="en-US" dirty="0">
+                <a:effectLst/>
+                <a:hlinkClick r:id="rId4"/>
+              </a:rPr>
+              <a:t>Apache HTTP Server 2.4</a:t>
+            </a:r>
+            <a:endParaRPr lang="en-US" dirty="0">
+              <a:effectLst/>
+            </a:endParaRPr>
+          </a:p>
+          <a:p>
+            <a:pPr lvl="0" fontAlgn="base"/>
+            <a:r>
+              <a:rPr lang="en-US" dirty="0">
+                <a:effectLst/>
+              </a:rPr>
+              <a:t>Database: </a:t>
+            </a:r>
+            <a:r>
+              <a:rPr lang="en-US" dirty="0">
+                <a:effectLst/>
+                <a:hlinkClick r:id="rId5"/>
+              </a:rPr>
+              <a:t>MongoDB</a:t>
+            </a:r>
+            <a:endParaRPr lang="en-US" dirty="0">
+              <a:effectLst/>
+            </a:endParaRPr>
+          </a:p>
+          <a:p>
+            <a:r>
+              <a:rPr lang="en-US" dirty="0">
+                <a:effectLst/>
+              </a:rPr>
+              <a:t>Automated deployment is enabled by running bash script as root, which will </a:t>
+            </a:r>
+            <a:endParaRPr lang="en-US" dirty="0"/>
+          </a:p>
+          <a:p>
+            <a:pPr lvl="1"/>
+            <a:r>
+              <a:rPr lang="en-US" dirty="0">
+                <a:effectLst/>
+              </a:rPr>
+              <a:t>install apache2, python, mongo driver, Flask and </a:t>
+            </a:r>
+            <a:r>
+              <a:rPr lang="en-US" dirty="0" err="1">
+                <a:effectLst/>
+              </a:rPr>
+              <a:t>mongoDB</a:t>
+            </a:r>
+            <a:endParaRPr lang="en-US" dirty="0">
+              <a:effectLst/>
+            </a:endParaRPr>
+          </a:p>
+          <a:p>
+            <a:pPr lvl="1"/>
             <a:r>
               <a:rPr lang="en-US" dirty="0"/>
-              <a:t>Design: HCI</a:t>
-            </a:r>
-          </a:p>
-        </p:txBody>
-      </p:sp>
-      <p:sp>
-        <p:nvSpPr>
-          <p:cNvPr id="3" name="Content Placeholder 2"/>
-          <p:cNvSpPr>
-            <a:spLocks noGrp="1"/>
-          </p:cNvSpPr>
-          <p:nvPr>
-            <p:ph idx="1"/>
-          </p:nvPr>
-        </p:nvSpPr>
-        <p:spPr/>
-        <p:txBody>
-          <a:bodyPr/>
-          <a:lstStyle/>
-          <a:p>
-            <a:r>
-              <a:rPr lang="en-US" dirty="0"/>
-              <a:t>Site navigation</a:t>
-            </a:r>
-          </a:p>
-          <a:p>
-            <a:r>
-              <a:rPr lang="en-US" dirty="0"/>
-              <a:t>Example Screens</a:t>
+              <a:t>migrate source code files to localhost</a:t>
             </a:r>
           </a:p>
         </p:txBody>
@@ -9362,7 +9441,7 @@
     </p:spTree>
     <p:extLst>
       <p:ext uri="{BB962C8B-B14F-4D97-AF65-F5344CB8AC3E}">
-        <p14:creationId xmlns:p14="http://schemas.microsoft.com/office/powerpoint/2010/main" val="1633707101"/>
+        <p14:creationId xmlns:p14="http://schemas.microsoft.com/office/powerpoint/2010/main" val="936177811"/>
       </p:ext>
     </p:extLst>
   </p:cSld>
@@ -9401,68 +9480,50 @@
         </p:nvSpPr>
         <p:spPr/>
         <p:txBody>
+          <a:bodyPr>
+            <a:normAutofit/>
+          </a:bodyPr>
+          <a:lstStyle/>
+          <a:p>
+            <a:r>
+              <a:rPr lang="en-US" dirty="0"/>
+              <a:t>Design: HCI</a:t>
+            </a:r>
+          </a:p>
+        </p:txBody>
+      </p:sp>
+      <p:sp>
+        <p:nvSpPr>
+          <p:cNvPr id="3" name="Content Placeholder 2"/>
+          <p:cNvSpPr>
+            <a:spLocks noGrp="1"/>
+          </p:cNvSpPr>
+          <p:nvPr>
+            <p:ph idx="1"/>
+          </p:nvPr>
+        </p:nvSpPr>
+        <p:spPr/>
+        <p:txBody>
           <a:bodyPr/>
           <a:lstStyle/>
           <a:p>
             <a:r>
               <a:rPr lang="en-US" dirty="0"/>
-              <a:t>Implementation</a:t>
-            </a:r>
-          </a:p>
-        </p:txBody>
-      </p:sp>
-      <p:sp>
-        <p:nvSpPr>
-          <p:cNvPr id="3" name="Content Placeholder 2"/>
-          <p:cNvSpPr>
-            <a:spLocks noGrp="1"/>
-          </p:cNvSpPr>
-          <p:nvPr>
-            <p:ph idx="1"/>
-          </p:nvPr>
-        </p:nvSpPr>
-        <p:spPr/>
-        <p:txBody>
-          <a:bodyPr/>
-          <a:lstStyle/>
+              <a:t>Site navigation</a:t>
+            </a:r>
+          </a:p>
           <a:p>
             <a:r>
               <a:rPr lang="en-US" dirty="0"/>
-              <a:t>Show core use cases</a:t>
-            </a:r>
-          </a:p>
-          <a:p>
-            <a:pPr lvl="1"/>
-            <a:r>
-              <a:rPr lang="en-US" dirty="0"/>
-              <a:t>Creating an account</a:t>
-            </a:r>
-          </a:p>
-          <a:p>
-            <a:pPr lvl="1"/>
-            <a:r>
-              <a:rPr lang="en-US" dirty="0"/>
-              <a:t>Updating your information</a:t>
-            </a:r>
-          </a:p>
-          <a:p>
-            <a:pPr lvl="1"/>
-            <a:r>
-              <a:rPr lang="en-US" dirty="0"/>
-              <a:t>Etc. </a:t>
-            </a:r>
-            <a:r>
-              <a:rPr lang="is-IS" dirty="0"/>
-              <a:t>… relevant to your design</a:t>
-            </a:r>
-            <a:endParaRPr lang="en-US" dirty="0"/>
+              <a:t>Example Screens</a:t>
+            </a:r>
           </a:p>
         </p:txBody>
       </p:sp>
     </p:spTree>
     <p:extLst>
       <p:ext uri="{BB962C8B-B14F-4D97-AF65-F5344CB8AC3E}">
-        <p14:creationId xmlns:p14="http://schemas.microsoft.com/office/powerpoint/2010/main" val="2605384893"/>
+        <p14:creationId xmlns:p14="http://schemas.microsoft.com/office/powerpoint/2010/main" val="1633707101"/>
       </p:ext>
     </p:extLst>
   </p:cSld>

</xml_diff>